<commit_message>
Added v2 of the presentaion, and minor code changes
</commit_message>
<xml_diff>
--- a/Contract-testing-presentation.pptx
+++ b/Contract-testing-presentation.pptx
@@ -262,7 +262,7 @@
           <a:p>
             <a:fld id="{285797F7-B584-2444-A80B-4076733C4FE4}" type="datetimeFigureOut">
               <a:rPr lang="en-NL" smtClean="0"/>
-              <a:t>05/06/2021</a:t>
+              <a:t>17/06/2021</a:t>
             </a:fld>
             <a:endParaRPr lang="en-NL"/>
           </a:p>
@@ -763,7 +763,7 @@
           <a:p>
             <a:fld id="{3C37AEF4-060C-854E-8FDF-5C41AB4533DB}" type="datetime1">
               <a:rPr lang="en-US" smtClean="0"/>
-              <a:t>6/5/21</a:t>
+              <a:t>6/17/21</a:t>
             </a:fld>
             <a:endParaRPr lang="en-NL"/>
           </a:p>
@@ -967,7 +967,7 @@
           <a:p>
             <a:fld id="{73BCE042-14E1-244D-A30D-BADB56A81442}" type="datetime1">
               <a:rPr lang="en-US" smtClean="0"/>
-              <a:t>6/5/21</a:t>
+              <a:t>6/17/21</a:t>
             </a:fld>
             <a:endParaRPr lang="en-NL"/>
           </a:p>
@@ -1181,7 +1181,7 @@
           <a:p>
             <a:fld id="{9F633E64-6E9A-FB44-96F4-C55051F0BC4D}" type="datetime1">
               <a:rPr lang="en-US" smtClean="0"/>
-              <a:t>6/5/21</a:t>
+              <a:t>6/17/21</a:t>
             </a:fld>
             <a:endParaRPr lang="en-NL"/>
           </a:p>
@@ -1385,7 +1385,7 @@
           <a:p>
             <a:fld id="{29B78103-61BA-1240-A296-FC5C86EAAFE8}" type="datetime1">
               <a:rPr lang="en-US" smtClean="0"/>
-              <a:t>6/5/21</a:t>
+              <a:t>6/17/21</a:t>
             </a:fld>
             <a:endParaRPr lang="en-NL"/>
           </a:p>
@@ -1665,7 +1665,7 @@
           <a:p>
             <a:fld id="{F2525007-2717-6544-B03C-3548708617FB}" type="datetime1">
               <a:rPr lang="en-US" smtClean="0"/>
-              <a:t>6/5/21</a:t>
+              <a:t>6/17/21</a:t>
             </a:fld>
             <a:endParaRPr lang="en-NL"/>
           </a:p>
@@ -1937,7 +1937,7 @@
           <a:p>
             <a:fld id="{66A9A406-F410-A943-9B5D-B422183285DC}" type="datetime1">
               <a:rPr lang="en-US" smtClean="0"/>
-              <a:t>6/5/21</a:t>
+              <a:t>6/17/21</a:t>
             </a:fld>
             <a:endParaRPr lang="en-NL"/>
           </a:p>
@@ -2356,7 +2356,7 @@
           <a:p>
             <a:fld id="{D563F7DA-D5B0-EA4C-8C76-C1BE135C1018}" type="datetime1">
               <a:rPr lang="en-US" smtClean="0"/>
-              <a:t>6/5/21</a:t>
+              <a:t>6/17/21</a:t>
             </a:fld>
             <a:endParaRPr lang="en-NL"/>
           </a:p>
@@ -2502,7 +2502,7 @@
           <a:p>
             <a:fld id="{BA66445F-081C-534F-BFE3-77387421BF66}" type="datetime1">
               <a:rPr lang="en-US" smtClean="0"/>
-              <a:t>6/5/21</a:t>
+              <a:t>6/17/21</a:t>
             </a:fld>
             <a:endParaRPr lang="en-NL"/>
           </a:p>
@@ -2619,7 +2619,7 @@
           <a:p>
             <a:fld id="{3925D451-3E69-D243-9CA2-1564179F5018}" type="datetime1">
               <a:rPr lang="en-US" smtClean="0"/>
-              <a:t>6/5/21</a:t>
+              <a:t>6/17/21</a:t>
             </a:fld>
             <a:endParaRPr lang="en-NL"/>
           </a:p>
@@ -2936,7 +2936,7 @@
           <a:p>
             <a:fld id="{0D9CC3B1-E967-0747-9F8D-A6CDC492B6AA}" type="datetime1">
               <a:rPr lang="en-US" smtClean="0"/>
-              <a:t>6/5/21</a:t>
+              <a:t>6/17/21</a:t>
             </a:fld>
             <a:endParaRPr lang="en-NL"/>
           </a:p>
@@ -3229,7 +3229,7 @@
           <a:p>
             <a:fld id="{ACA566DA-EAFF-8645-889D-77625A88D91D}" type="datetime1">
               <a:rPr lang="en-US" smtClean="0"/>
-              <a:t>6/5/21</a:t>
+              <a:t>6/17/21</a:t>
             </a:fld>
             <a:endParaRPr lang="en-NL"/>
           </a:p>
@@ -3476,7 +3476,7 @@
           <a:p>
             <a:fld id="{A5CC36B8-08FA-1C47-B260-42099A1286CB}" type="datetime1">
               <a:rPr lang="en-US" smtClean="0"/>
-              <a:t>6/5/21</a:t>
+              <a:t>6/17/21</a:t>
             </a:fld>
             <a:endParaRPr lang="en-NL"/>
           </a:p>
@@ -9272,7 +9272,7 @@
                 <a:latin typeface="Cordia New" panose="020B0304020202020204" pitchFamily="34" charset="-34"/>
                 <a:cs typeface="Cordia New" panose="020B0304020202020204" pitchFamily="34" charset="-34"/>
               </a:rPr>
-              <a:t>We wil use these contract definitions (examples in 3 languages)</a:t>
+              <a:t>We will use these contract definitions (examples in 3 languages)</a:t>
             </a:r>
           </a:p>
           <a:p>
@@ -16930,7 +16930,15 @@
           <a:p>
             <a:r>
               <a:rPr lang="en-NL" sz="2000" dirty="0"/>
-              <a:t>For example, if CurrencyCode is added to the response for </a:t>
+              <a:t>For example, if </a:t>
+            </a:r>
+            <a:r>
+              <a:rPr lang="en-NL" sz="2000" b="1" dirty="0"/>
+              <a:t>CurrencyCode</a:t>
+            </a:r>
+            <a:r>
+              <a:rPr lang="en-NL" sz="2000" dirty="0"/>
+              <a:t> is added to the response for </a:t>
             </a:r>
             <a:r>
               <a:rPr lang="en-NL" sz="2000" i="1" dirty="0"/>
@@ -19488,7 +19496,7 @@
                   <a:schemeClr val="tx1"/>
                 </a:solidFill>
               </a:rPr>
-              <a:t>Service 3</a:t>
+              <a:t>Service 4</a:t>
             </a:r>
           </a:p>
         </p:txBody>
@@ -19642,6 +19650,12 @@
           <a:p>
             <a:r>
               <a:rPr lang="en-NL" sz="2400" dirty="0"/>
+              <a:t>Verification!!</a:t>
+            </a:r>
+          </a:p>
+          <a:p>
+            <a:r>
+              <a:rPr lang="en-NL" sz="2400" dirty="0"/>
               <a:t>Clearly define what you want to test</a:t>
             </a:r>
           </a:p>
@@ -19662,7 +19676,15 @@
           <a:p>
             <a:r>
               <a:rPr lang="en-NL" sz="2400" dirty="0"/>
-              <a:t>Run pipelines regularly in Jenkins, Azure, etc to regularly to detect issues. Or set up triggers so that if a provider is changed, the relevant consumer pipelines will run</a:t>
+              <a:t>Run </a:t>
+            </a:r>
+            <a:r>
+              <a:rPr lang="en-NL" sz="2400" b="1" dirty="0"/>
+              <a:t>Consumer</a:t>
+            </a:r>
+            <a:r>
+              <a:rPr lang="en-NL" sz="2400" dirty="0"/>
+              <a:t> pipelines regularly in Jenkins, Azure, etc to regularly to detect issues. Or set up triggers so that if a provider is changed, the relevant consumer pipelines will run</a:t>
             </a:r>
           </a:p>
           <a:p>

</xml_diff>